<commit_message>
last stuff on presentation
</commit_message>
<xml_diff>
--- a/Vortrag/[MASTER] Präsentation.pptx
+++ b/Vortrag/[MASTER] Präsentation.pptx
@@ -6269,11 +6269,7 @@
             </a:r>
             <a:r>
               <a:rPr lang="de-DE" dirty="0" smtClean="0"/>
-              <a:t> Anwendung: </a:t>
-            </a:r>
-            <a:r>
-              <a:rPr lang="de-DE" dirty="0" smtClean="0"/>
-              <a:t>Berechnungen</a:t>
+              <a:t> Anwendung: Berechnungen</a:t>
             </a:r>
             <a:endParaRPr lang="de-DE" dirty="0"/>
           </a:p>
@@ -8505,13 +8501,8 @@
             </a:pPr>
             <a:r>
               <a:rPr lang="de-DE" sz="2400" dirty="0" smtClean="0"/>
-              <a:t>Für </a:t>
-            </a:r>
-            <a:r>
-              <a:rPr lang="de-DE" sz="2400" dirty="0" smtClean="0"/>
-              <a:t>Knoten</a:t>
-            </a:r>
-            <a:endParaRPr lang="de-DE" sz="2400" dirty="0" smtClean="0"/>
+              <a:t>Für Knoten</a:t>
+            </a:r>
           </a:p>
           <a:p>
             <a:pPr marL="522287" lvl="1" indent="-342900">
@@ -8520,8 +8511,21 @@
             </a:pPr>
             <a:r>
               <a:rPr lang="de-DE" sz="2400" dirty="0" smtClean="0"/>
-              <a:t>Erhöhe Alter um eins für alle Nachbarn</a:t>
-            </a:r>
+              <a:t>Erhöhe Alter </a:t>
+            </a:r>
+            <a:r>
+              <a:rPr lang="de-DE" sz="2400" dirty="0" smtClean="0"/>
+              <a:t>für </a:t>
+            </a:r>
+            <a:r>
+              <a:rPr lang="de-DE" sz="2400" dirty="0" smtClean="0"/>
+              <a:t>alle </a:t>
+            </a:r>
+            <a:r>
+              <a:rPr lang="de-DE" sz="2400" dirty="0" smtClean="0"/>
+              <a:t>Nachbarn um 1</a:t>
+            </a:r>
+            <a:endParaRPr lang="de-DE" sz="2400" dirty="0" smtClean="0"/>
           </a:p>
           <a:p>
             <a:pPr marL="522287" lvl="1" indent="-342900">
@@ -8530,15 +8534,7 @@
             </a:pPr>
             <a:r>
               <a:rPr lang="de-DE" sz="2400" dirty="0" smtClean="0"/>
-              <a:t>Wähle ältesten </a:t>
-            </a:r>
-            <a:r>
-              <a:rPr lang="de-DE" sz="2400" dirty="0" smtClean="0"/>
-              <a:t>Nachbar     und        zufällige </a:t>
-            </a:r>
-            <a:r>
-              <a:rPr lang="de-DE" sz="2400" dirty="0" smtClean="0"/>
-              <a:t>Nachbarn</a:t>
+              <a:t>Wähle ältesten Nachbar     und        zufällige Nachbarn</a:t>
             </a:r>
           </a:p>
           <a:p>
@@ -8548,17 +8544,8 @@
             </a:pPr>
             <a:r>
               <a:rPr lang="de-DE" sz="2400" dirty="0" smtClean="0"/>
-              <a:t>Ersetze	     Eintrag </a:t>
-            </a:r>
-            <a:r>
-              <a:rPr lang="de-DE" sz="2400" dirty="0" smtClean="0"/>
-              <a:t>mit dem Alter 0 und Adresse </a:t>
-            </a:r>
-            <a:r>
-              <a:rPr lang="de-DE" sz="2400" dirty="0" smtClean="0"/>
-              <a:t>von</a:t>
-            </a:r>
-            <a:endParaRPr lang="de-DE" sz="2400" dirty="0" smtClean="0"/>
+              <a:t>Ersetze	     Eintrag mit dem Alter 0 und Adresse von</a:t>
+            </a:r>
           </a:p>
           <a:p>
             <a:pPr marL="522287" lvl="1" indent="-342900">
@@ -8567,13 +8554,8 @@
             </a:pPr>
             <a:r>
               <a:rPr lang="de-DE" sz="2400" dirty="0" smtClean="0"/>
-              <a:t>Sende aktualisierte Teilmenge </a:t>
-            </a:r>
-            <a:r>
-              <a:rPr lang="de-DE" sz="2400" dirty="0" smtClean="0"/>
-              <a:t>zu</a:t>
-            </a:r>
-            <a:endParaRPr lang="de-DE" sz="2400" dirty="0" smtClean="0"/>
+              <a:t>Sende aktualisierte Teilmenge zu</a:t>
+            </a:r>
           </a:p>
           <a:p>
             <a:pPr marL="522287" lvl="1" indent="-342900">
@@ -8582,15 +8564,7 @@
             </a:pPr>
             <a:r>
               <a:rPr lang="de-DE" sz="2400" dirty="0" smtClean="0"/>
-              <a:t>Empfange eine Teilmenge </a:t>
-            </a:r>
-            <a:r>
-              <a:rPr lang="de-DE" sz="2400" dirty="0" smtClean="0"/>
-              <a:t>von     mit </a:t>
-            </a:r>
-            <a:r>
-              <a:rPr lang="de-DE" sz="2400" dirty="0" smtClean="0"/>
-              <a:t>i eignen Einträgen</a:t>
+              <a:t>Empfange eine Teilmenge von     mit i eignen Einträgen</a:t>
             </a:r>
           </a:p>
           <a:p>
@@ -8600,23 +8574,7 @@
             </a:pPr>
             <a:r>
               <a:rPr lang="de-DE" sz="2400" dirty="0" smtClean="0"/>
-              <a:t>Verwerfe Einträge die auf </a:t>
-            </a:r>
-            <a:r>
-              <a:rPr lang="de-DE" sz="2400" dirty="0" smtClean="0"/>
-              <a:t>   zeigen </a:t>
-            </a:r>
-            <a:r>
-              <a:rPr lang="de-DE" sz="2400" dirty="0" smtClean="0"/>
-              <a:t>und in </a:t>
-            </a:r>
-            <a:r>
-              <a:rPr lang="de-DE" sz="2400" dirty="0" smtClean="0"/>
-              <a:t>      Cache </a:t>
-            </a:r>
-            <a:r>
-              <a:rPr lang="de-DE" sz="2400" dirty="0" smtClean="0"/>
-              <a:t>liegen</a:t>
+              <a:t>Verwerfe Einträge die auf    zeigen und in       Cache liegen</a:t>
             </a:r>
           </a:p>
           <a:p>
@@ -8626,19 +8584,7 @@
             </a:pPr>
             <a:r>
               <a:rPr lang="de-DE" sz="2400" dirty="0" smtClean="0"/>
-              <a:t>Aktualisiere	Cache </a:t>
-            </a:r>
-            <a:r>
-              <a:rPr lang="de-DE" sz="2400" dirty="0" smtClean="0"/>
-              <a:t>und füge alle verbleibenden Einträge hinzu. (erst die leeren Cacheeinträge nutzen, dann ersetze die Einträge, die man </a:t>
-            </a:r>
-            <a:r>
-              <a:rPr lang="de-DE" sz="2400" dirty="0" smtClean="0"/>
-              <a:t>zu     geschickt </a:t>
-            </a:r>
-            <a:r>
-              <a:rPr lang="de-DE" sz="2400" dirty="0" smtClean="0"/>
-              <a:t>hat)</a:t>
+              <a:t>Aktualisiere	Cache und füge alle verbleibenden Einträge hinzu. (erst die leeren Cacheeinträge nutzen, dann ersetze die Einträge, die man zu     geschickt hat)</a:t>
             </a:r>
             <a:r>
               <a:rPr lang="de-DE" dirty="0" smtClean="0"/>
@@ -9975,13 +9921,8 @@
           <a:p>
             <a:r>
               <a:rPr lang="de-DE" sz="2400" dirty="0" smtClean="0"/>
-              <a:t>Für Knoten </a:t>
-            </a:r>
-            <a:r>
-              <a:rPr lang="de-DE" sz="2400" dirty="0" smtClean="0"/>
-              <a:t>   :</a:t>
-            </a:r>
-            <a:endParaRPr lang="de-DE" sz="2400" dirty="0" smtClean="0"/>
+              <a:t>Für Knoten    :</a:t>
+            </a:r>
           </a:p>
           <a:p>
             <a:pPr marL="522287" lvl="1" indent="-342900">
@@ -9990,21 +9931,8 @@
             </a:pPr>
             <a:r>
               <a:rPr lang="de-DE" sz="2400" dirty="0" smtClean="0"/>
-              <a:t>Wähle </a:t>
-            </a:r>
-            <a:r>
-              <a:rPr lang="de-DE" sz="2400" dirty="0" smtClean="0"/>
-              <a:t>  zufällige </a:t>
-            </a:r>
-            <a:r>
-              <a:rPr lang="de-DE" sz="2400" dirty="0" smtClean="0"/>
-              <a:t>Nachbarn, sende </a:t>
-            </a:r>
-            <a:r>
-              <a:rPr lang="de-DE" sz="2400" dirty="0" smtClean="0"/>
-              <a:t>an</a:t>
-            </a:r>
-            <a:endParaRPr lang="de-DE" sz="2400" dirty="0" smtClean="0"/>
+              <a:t>Wähle   zufällige Nachbarn, sende an</a:t>
+            </a:r>
           </a:p>
           <a:p>
             <a:pPr marL="522287" lvl="1" indent="-342900">
@@ -10013,27 +9941,7 @@
             </a:pPr>
             <a:r>
               <a:rPr lang="de-DE" sz="2400" dirty="0" smtClean="0"/>
-              <a:t>Verwerfe </a:t>
-            </a:r>
-            <a:r>
-              <a:rPr lang="de-DE" sz="2400" dirty="0" smtClean="0"/>
-              <a:t>Einträge die </a:t>
-            </a:r>
-            <a:r>
-              <a:rPr lang="de-DE" sz="2400" dirty="0" smtClean="0"/>
-              <a:t>auf     zeigen </a:t>
-            </a:r>
-            <a:r>
-              <a:rPr lang="de-DE" sz="2400" dirty="0" smtClean="0"/>
-              <a:t>und in </a:t>
-            </a:r>
-            <a:r>
-              <a:rPr lang="de-DE" sz="2400" dirty="0" smtClean="0"/>
-              <a:t>      Cache </a:t>
-            </a:r>
-            <a:r>
-              <a:rPr lang="de-DE" sz="2400" dirty="0" smtClean="0"/>
-              <a:t>liegen</a:t>
+              <a:t>Verwerfe Einträge die auf     zeigen und in       Cache liegen</a:t>
             </a:r>
           </a:p>
           <a:p>
@@ -10043,23 +9951,7 @@
             </a:pPr>
             <a:r>
               <a:rPr lang="de-DE" sz="2400" dirty="0" smtClean="0"/>
-              <a:t>Aktualisiere </a:t>
-            </a:r>
-            <a:r>
-              <a:rPr lang="de-DE" sz="2400" dirty="0" smtClean="0"/>
-              <a:t>       Cache </a:t>
-            </a:r>
-            <a:r>
-              <a:rPr lang="de-DE" sz="2400" dirty="0" smtClean="0"/>
-              <a:t>und füge alle verbleibenden Einträge hinzu. (erst die leeren Cacheeinträge nutzen, dann ersetze die Einträge, die man </a:t>
-            </a:r>
-            <a:r>
-              <a:rPr lang="de-DE" sz="2400" dirty="0" smtClean="0"/>
-              <a:t>zu     geschickt </a:t>
-            </a:r>
-            <a:r>
-              <a:rPr lang="de-DE" sz="2400" dirty="0" smtClean="0"/>
-              <a:t>hat) </a:t>
+              <a:t>Aktualisiere        Cache und füge alle verbleibenden Einträge hinzu. (erst die leeren Cacheeinträge nutzen, dann ersetze die Einträge, die man zu     geschickt hat) </a:t>
             </a:r>
           </a:p>
           <a:p>
@@ -10096,12 +9988,13 @@
             </a:pPr>
             <a:r>
               <a:rPr lang="de-DE" sz="2400" dirty="0" smtClean="0"/>
-              <a:t>    Anzahl </a:t>
-            </a:r>
-            <a:r>
-              <a:rPr lang="de-DE" sz="2400" dirty="0" smtClean="0"/>
-              <a:t>d. ausgetauschten Nachbarn)</a:t>
-            </a:r>
+              <a:t>    Anzahl d. </a:t>
+            </a:r>
+            <a:r>
+              <a:rPr lang="de-DE" sz="2400" smtClean="0"/>
+              <a:t>ausgetauschten Nachbarn</a:t>
+            </a:r>
+            <a:endParaRPr lang="de-DE" sz="2400" dirty="0" smtClean="0"/>
           </a:p>
           <a:p>
             <a:pPr marL="890587" lvl="2" indent="-342900">
@@ -10110,11 +10003,7 @@
             </a:pPr>
             <a:r>
               <a:rPr lang="de-DE" sz="2400" dirty="0" smtClean="0"/>
-              <a:t>       Zeitintervall </a:t>
-            </a:r>
-            <a:r>
-              <a:rPr lang="de-DE" sz="2400" dirty="0" smtClean="0"/>
-              <a:t>zwischen den Nachrichten</a:t>
+              <a:t>       Zeitintervall zwischen den Nachrichten</a:t>
             </a:r>
           </a:p>
         </p:txBody>
@@ -11459,7 +11348,6 @@
               <a:rPr lang="de-DE" dirty="0" smtClean="0"/>
               <a:t>Berechnungen</a:t>
             </a:r>
-            <a:endParaRPr lang="de-DE" dirty="0" smtClean="0"/>
           </a:p>
           <a:p>
             <a:pPr marL="698500" lvl="1" indent="-342900">
@@ -12568,7 +12456,6 @@
               <a:rPr lang="de-DE" sz="2400" dirty="0" smtClean="0"/>
               <a:t>Konnektivität</a:t>
             </a:r>
-            <a:endParaRPr lang="de-DE" sz="2400" dirty="0" smtClean="0"/>
           </a:p>
           <a:p>
             <a:pPr lvl="1">
@@ -16715,15 +16602,7 @@
                   <a:srgbClr val="003366"/>
                 </a:solidFill>
               </a:rPr>
-              <a:t> Struktur: </a:t>
-            </a:r>
-            <a:r>
-              <a:rPr lang="de-DE" sz="3000" b="1" dirty="0" smtClean="0">
-                <a:solidFill>
-                  <a:srgbClr val="003366"/>
-                </a:solidFill>
-              </a:rPr>
-              <a:t>Datenverarbeitung</a:t>
+              <a:t> Struktur: Datenverarbeitung</a:t>
             </a:r>
             <a:endParaRPr lang="de-DE" sz="3000" dirty="0" smtClean="0"/>
           </a:p>
@@ -17900,11 +17779,7 @@
             </a:br>
             <a:r>
               <a:rPr lang="de-DE" sz="2400" dirty="0" smtClean="0"/>
-              <a:t>lokalen Cache (Nachbarliste) </a:t>
-            </a:r>
-            <a:r>
-              <a:rPr lang="de-DE" sz="2400" dirty="0" smtClean="0"/>
-              <a:t>ausgewählt</a:t>
+              <a:t>lokalen Cache (Nachbarliste) ausgewählt</a:t>
             </a:r>
           </a:p>
           <a:p>
@@ -17937,11 +17812,7 @@
             </a:pPr>
             <a:r>
               <a:rPr lang="de-DE" sz="2400" dirty="0" smtClean="0"/>
-              <a:t>	Weitergabe der lokalen </a:t>
-            </a:r>
-            <a:r>
-              <a:rPr lang="de-DE" sz="2400" dirty="0" smtClean="0"/>
-              <a:t>Liste</a:t>
+              <a:t>	Weitergabe der lokalen Liste</a:t>
             </a:r>
           </a:p>
           <a:p>

</xml_diff>